<commit_message>
updates from ietf 118 wrap up
</commit_message>
<xml_diff>
--- a/118/NMRG/draft-netana-iepg-nmrg-network-anomaly-semantics-01.pptx
+++ b/118/NMRG/draft-netana-iepg-nmrg-network-anomaly-semantics-01.pptx
@@ -142,7 +142,7 @@
   <pc:docChgLst>
     <pc:chgData name="Graf Thomas, INI-NET-VNC-HCS" userId="487bc3e3-9ce7-4cdd-b7b4-8899ea88d289" providerId="ADAL" clId="{FF1E8771-B1E8-4CEC-B725-4345F27D3194}"/>
     <pc:docChg chg="undo redo custSel addSld delSld modSld sldOrd">
-      <pc:chgData name="Graf Thomas, INI-NET-VNC-HCS" userId="487bc3e3-9ce7-4cdd-b7b4-8899ea88d289" providerId="ADAL" clId="{FF1E8771-B1E8-4CEC-B725-4345F27D3194}" dt="2023-10-29T08:55:26.855" v="4218" actId="20577"/>
+      <pc:chgData name="Graf Thomas, INI-NET-VNC-HCS" userId="487bc3e3-9ce7-4cdd-b7b4-8899ea88d289" providerId="ADAL" clId="{FF1E8771-B1E8-4CEC-B725-4345F27D3194}" dt="2023-11-07T12:40:28.631" v="4365" actId="20577"/>
       <pc:docMkLst>
         <pc:docMk/>
       </pc:docMkLst>
@@ -184,7 +184,7 @@
         </pc:sldMkLst>
       </pc:sldChg>
       <pc:sldChg chg="modSp mod ord">
-        <pc:chgData name="Graf Thomas, INI-NET-VNC-HCS" userId="487bc3e3-9ce7-4cdd-b7b4-8899ea88d289" providerId="ADAL" clId="{FF1E8771-B1E8-4CEC-B725-4345F27D3194}" dt="2023-10-29T08:55:05.497" v="4182" actId="207"/>
+        <pc:chgData name="Graf Thomas, INI-NET-VNC-HCS" userId="487bc3e3-9ce7-4cdd-b7b4-8899ea88d289" providerId="ADAL" clId="{FF1E8771-B1E8-4CEC-B725-4345F27D3194}" dt="2023-11-07T12:40:28.631" v="4365" actId="20577"/>
         <pc:sldMkLst>
           <pc:docMk/>
           <pc:sldMk cId="2578889968" sldId="26415"/>
@@ -198,7 +198,7 @@
           </ac:spMkLst>
         </pc:spChg>
         <pc:spChg chg="mod">
-          <ac:chgData name="Graf Thomas, INI-NET-VNC-HCS" userId="487bc3e3-9ce7-4cdd-b7b4-8899ea88d289" providerId="ADAL" clId="{FF1E8771-B1E8-4CEC-B725-4345F27D3194}" dt="2023-10-29T08:55:05.497" v="4182" actId="207"/>
+          <ac:chgData name="Graf Thomas, INI-NET-VNC-HCS" userId="487bc3e3-9ce7-4cdd-b7b4-8899ea88d289" providerId="ADAL" clId="{FF1E8771-B1E8-4CEC-B725-4345F27D3194}" dt="2023-11-07T12:40:28.631" v="4365" actId="20577"/>
           <ac:spMkLst>
             <pc:docMk/>
             <pc:sldMk cId="2578889968" sldId="26415"/>
@@ -1601,7 +1601,7 @@
   <pc:docChgLst>
     <pc:chgData name="Thomas Graf" userId="487bc3e3-9ce7-4cdd-b7b4-8899ea88d289" providerId="ADAL" clId="{FF1E8771-B1E8-4CEC-B725-4345F27D3194}"/>
     <pc:docChg chg="undo custSel addSld delSld modSld">
-      <pc:chgData name="Thomas Graf" userId="487bc3e3-9ce7-4cdd-b7b4-8899ea88d289" providerId="ADAL" clId="{FF1E8771-B1E8-4CEC-B725-4345F27D3194}" dt="2023-11-01T05:14:28.252" v="1806" actId="478"/>
+      <pc:chgData name="Thomas Graf" userId="487bc3e3-9ce7-4cdd-b7b4-8899ea88d289" providerId="ADAL" clId="{FF1E8771-B1E8-4CEC-B725-4345F27D3194}" dt="2023-11-08T08:22:46.257" v="2148" actId="20577"/>
       <pc:docMkLst>
         <pc:docMk/>
       </pc:docMkLst>
@@ -1629,13 +1629,13 @@
         </pc:spChg>
       </pc:sldChg>
       <pc:sldChg chg="modSp mod">
-        <pc:chgData name="Thomas Graf" userId="487bc3e3-9ce7-4cdd-b7b4-8899ea88d289" providerId="ADAL" clId="{FF1E8771-B1E8-4CEC-B725-4345F27D3194}" dt="2023-11-01T05:09:27.991" v="1701" actId="20577"/>
+        <pc:chgData name="Thomas Graf" userId="487bc3e3-9ce7-4cdd-b7b4-8899ea88d289" providerId="ADAL" clId="{FF1E8771-B1E8-4CEC-B725-4345F27D3194}" dt="2023-11-08T08:22:46.257" v="2148" actId="20577"/>
         <pc:sldMkLst>
           <pc:docMk/>
           <pc:sldMk cId="2578889968" sldId="26415"/>
         </pc:sldMkLst>
         <pc:spChg chg="mod">
-          <ac:chgData name="Thomas Graf" userId="487bc3e3-9ce7-4cdd-b7b4-8899ea88d289" providerId="ADAL" clId="{FF1E8771-B1E8-4CEC-B725-4345F27D3194}" dt="2023-10-29T12:54:30.834" v="1488" actId="113"/>
+          <ac:chgData name="Thomas Graf" userId="487bc3e3-9ce7-4cdd-b7b4-8899ea88d289" providerId="ADAL" clId="{FF1E8771-B1E8-4CEC-B725-4345F27D3194}" dt="2023-11-08T08:22:46.257" v="2148" actId="20577"/>
           <ac:spMkLst>
             <pc:docMk/>
             <pc:sldMk cId="2578889968" sldId="26415"/>
@@ -2222,7 +2222,7 @@
           <a:p>
             <a:fld id="{E5E705E9-673F-4AC4-B29E-A7B26F3B8523}" type="datetimeFigureOut">
               <a:rPr lang="de-CH" smtClean="0"/>
-              <a:t>05.11.2023</a:t>
+              <a:t>08.11.2023</a:t>
             </a:fld>
             <a:endParaRPr lang="de-CH"/>
           </a:p>
@@ -2639,7 +2639,7 @@
           <a:p>
             <a:fld id="{9E9B238C-2335-4007-98C9-471C02CC43B6}" type="datetimeFigureOut">
               <a:rPr lang="de-CH" smtClean="0"/>
-              <a:t>05.11.2023</a:t>
+              <a:t>08.11.2023</a:t>
             </a:fld>
             <a:endParaRPr lang="de-CH"/>
           </a:p>
@@ -2839,7 +2839,7 @@
           <a:p>
             <a:fld id="{9E9B238C-2335-4007-98C9-471C02CC43B6}" type="datetimeFigureOut">
               <a:rPr lang="de-CH" smtClean="0"/>
-              <a:t>05.11.2023</a:t>
+              <a:t>08.11.2023</a:t>
             </a:fld>
             <a:endParaRPr lang="de-CH"/>
           </a:p>
@@ -3049,7 +3049,7 @@
           <a:p>
             <a:fld id="{9E9B238C-2335-4007-98C9-471C02CC43B6}" type="datetimeFigureOut">
               <a:rPr lang="de-CH" smtClean="0"/>
-              <a:t>05.11.2023</a:t>
+              <a:t>08.11.2023</a:t>
             </a:fld>
             <a:endParaRPr lang="de-CH"/>
           </a:p>
@@ -3478,7 +3478,7 @@
           <a:p>
             <a:fld id="{9E9B238C-2335-4007-98C9-471C02CC43B6}" type="datetimeFigureOut">
               <a:rPr lang="de-CH" smtClean="0"/>
-              <a:t>05.11.2023</a:t>
+              <a:t>08.11.2023</a:t>
             </a:fld>
             <a:endParaRPr lang="de-CH"/>
           </a:p>
@@ -3754,7 +3754,7 @@
           <a:p>
             <a:fld id="{9E9B238C-2335-4007-98C9-471C02CC43B6}" type="datetimeFigureOut">
               <a:rPr lang="de-CH" smtClean="0"/>
-              <a:t>05.11.2023</a:t>
+              <a:t>08.11.2023</a:t>
             </a:fld>
             <a:endParaRPr lang="de-CH"/>
           </a:p>
@@ -4022,7 +4022,7 @@
           <a:p>
             <a:fld id="{9E9B238C-2335-4007-98C9-471C02CC43B6}" type="datetimeFigureOut">
               <a:rPr lang="de-CH" smtClean="0"/>
-              <a:t>05.11.2023</a:t>
+              <a:t>08.11.2023</a:t>
             </a:fld>
             <a:endParaRPr lang="de-CH"/>
           </a:p>
@@ -4437,7 +4437,7 @@
           <a:p>
             <a:fld id="{9E9B238C-2335-4007-98C9-471C02CC43B6}" type="datetimeFigureOut">
               <a:rPr lang="de-CH" smtClean="0"/>
-              <a:t>05.11.2023</a:t>
+              <a:t>08.11.2023</a:t>
             </a:fld>
             <a:endParaRPr lang="de-CH"/>
           </a:p>
@@ -4579,7 +4579,7 @@
           <a:p>
             <a:fld id="{9E9B238C-2335-4007-98C9-471C02CC43B6}" type="datetimeFigureOut">
               <a:rPr lang="de-CH" smtClean="0"/>
-              <a:t>05.11.2023</a:t>
+              <a:t>08.11.2023</a:t>
             </a:fld>
             <a:endParaRPr lang="de-CH"/>
           </a:p>
@@ -4692,7 +4692,7 @@
           <a:p>
             <a:fld id="{9E9B238C-2335-4007-98C9-471C02CC43B6}" type="datetimeFigureOut">
               <a:rPr lang="de-CH" smtClean="0"/>
-              <a:t>05.11.2023</a:t>
+              <a:t>08.11.2023</a:t>
             </a:fld>
             <a:endParaRPr lang="de-CH"/>
           </a:p>
@@ -5005,7 +5005,7 @@
           <a:p>
             <a:fld id="{9E9B238C-2335-4007-98C9-471C02CC43B6}" type="datetimeFigureOut">
               <a:rPr lang="de-CH" smtClean="0"/>
-              <a:t>05.11.2023</a:t>
+              <a:t>08.11.2023</a:t>
             </a:fld>
             <a:endParaRPr lang="de-CH"/>
           </a:p>
@@ -5294,7 +5294,7 @@
           <a:p>
             <a:fld id="{9E9B238C-2335-4007-98C9-471C02CC43B6}" type="datetimeFigureOut">
               <a:rPr lang="de-CH" smtClean="0"/>
-              <a:t>05.11.2023</a:t>
+              <a:t>08.11.2023</a:t>
             </a:fld>
             <a:endParaRPr lang="de-CH"/>
           </a:p>
@@ -5537,7 +5537,7 @@
           <a:p>
             <a:fld id="{9E9B238C-2335-4007-98C9-471C02CC43B6}" type="datetimeFigureOut">
               <a:rPr lang="de-CH" smtClean="0"/>
-              <a:t>05.11.2023</a:t>
+              <a:t>08.11.2023</a:t>
             </a:fld>
             <a:endParaRPr lang="de-CH"/>
           </a:p>
@@ -12378,6 +12378,20 @@
             <a:noAutofit/>
           </a:bodyPr>
           <a:lstStyle/>
+          <a:p>
+            <a:r>
+              <a:rPr lang="en-US" sz="2000" b="1" dirty="0"/>
+              <a:t>This work relates to the data topic, specifically semantics and ontology for network management related artificial intelligence and </a:t>
+            </a:r>
+            <a:r>
+              <a:rPr lang="en-US" sz="2000" b="1"/>
+              <a:t>machine learning </a:t>
+            </a:r>
+            <a:r>
+              <a:rPr lang="en-US" sz="2000" b="1" dirty="0"/>
+              <a:t>previously discussed in NMRG meetings.</a:t>
+            </a:r>
+          </a:p>
           <a:p>
             <a:r>
               <a:rPr lang="en-US" sz="2000" b="1" dirty="0"/>

</xml_diff>